<commit_message>
Presented this ppt file
</commit_message>
<xml_diff>
--- a/Clay/Novel_Corona_Virus_2019_v3.pptx
+++ b/Clay/Novel_Corona_Virus_2019_v3.pptx
@@ -10829,6 +10829,14 @@
 <file path=ppt/slides/slide28.xml><?xml version="1.0" encoding="utf-8"?>
 <p:sld xmlns:a="http://schemas.openxmlformats.org/drawingml/2006/main" xmlns:r="http://schemas.openxmlformats.org/officeDocument/2006/relationships" xmlns:p="http://schemas.openxmlformats.org/presentationml/2006/main">
   <p:cSld>
+    <p:bg>
+      <p:bgPr>
+        <a:solidFill>
+          <a:schemeClr val="bg1"/>
+        </a:solidFill>
+        <a:effectLst/>
+      </p:bgPr>
+    </p:bg>
     <p:spTree>
       <p:nvGrpSpPr>
         <p:cNvPr id="1" name=""/>
@@ -10843,87 +10851,62 @@
           <a:chExt cx="0" cy="0"/>
         </a:xfrm>
       </p:grpSpPr>
-      <p:sp>
-        <p:nvSpPr>
-          <p:cNvPr id="2" name="Date Placeholder 1">
-            <a:extLst>
-              <a:ext uri="{FF2B5EF4-FFF2-40B4-BE49-F238E27FC236}">
-                <a16:creationId xmlns:a16="http://schemas.microsoft.com/office/drawing/2014/main" id="{CE5DB7E6-95CC-4B40-B5A1-52F98B971718}"/>
-              </a:ext>
-            </a:extLst>
-          </p:cNvPr>
-          <p:cNvSpPr>
-            <a:spLocks noGrp="1"/>
-          </p:cNvSpPr>
-          <p:nvPr>
-            <p:ph type="dt" sz="half" idx="10"/>
-          </p:nvPr>
-        </p:nvSpPr>
-        <p:spPr/>
-        <p:txBody>
-          <a:bodyPr/>
-          <a:lstStyle/>
-          <a:p>
-            <a:r>
-              <a:rPr lang="en-US"/>
-              <a:t>6/9/2021</a:t>
-            </a:r>
-          </a:p>
-        </p:txBody>
-      </p:sp>
-      <p:sp>
-        <p:nvSpPr>
-          <p:cNvPr id="3" name="Footer Placeholder 2">
-            <a:extLst>
-              <a:ext uri="{FF2B5EF4-FFF2-40B4-BE49-F238E27FC236}">
-                <a16:creationId xmlns:a16="http://schemas.microsoft.com/office/drawing/2014/main" id="{F9C71061-44F4-4298-A2F1-DB7F955F92C4}"/>
-              </a:ext>
-            </a:extLst>
-          </p:cNvPr>
-          <p:cNvSpPr>
-            <a:spLocks noGrp="1"/>
-          </p:cNvSpPr>
-          <p:nvPr>
-            <p:ph type="ftr" sz="quarter" idx="11"/>
-          </p:nvPr>
-        </p:nvSpPr>
-        <p:spPr/>
-        <p:txBody>
-          <a:bodyPr/>
-          <a:lstStyle/>
-          <a:p>
-            <a:r>
-              <a:rPr lang="en-US"/>
-              <a:t>https://github.com/makbarish/Grp5_Project1_Covid19</a:t>
-            </a:r>
-          </a:p>
-        </p:txBody>
-      </p:sp>
-      <p:sp>
-        <p:nvSpPr>
-          <p:cNvPr id="4" name="Slide Number Placeholder 3">
-            <a:extLst>
-              <a:ext uri="{FF2B5EF4-FFF2-40B4-BE49-F238E27FC236}">
-                <a16:creationId xmlns:a16="http://schemas.microsoft.com/office/drawing/2014/main" id="{6417783F-0E52-48D5-AAC7-F8904842DBBC}"/>
-              </a:ext>
-            </a:extLst>
-          </p:cNvPr>
-          <p:cNvSpPr>
-            <a:spLocks noGrp="1"/>
-          </p:cNvSpPr>
-          <p:nvPr>
-            <p:ph type="sldNum" sz="quarter" idx="12"/>
-          </p:nvPr>
-        </p:nvSpPr>
-        <p:spPr/>
-        <p:txBody>
-          <a:bodyPr/>
-          <a:lstStyle/>
-          <a:p>
-            <a:fld id="{3AA9003C-6A8E-4863-AB7A-EC3E1B799067}" type="slidenum">
-              <a:rPr lang="en-US" smtClean="0"/>
-              <a:t>28</a:t>
-            </a:fld>
+      <p:sp useBgFill="1">
+        <p:nvSpPr>
+          <p:cNvPr id="13" name="Rectangle 12">
+            <a:extLst>
+              <a:ext uri="{FF2B5EF4-FFF2-40B4-BE49-F238E27FC236}">
+                <a16:creationId xmlns:a16="http://schemas.microsoft.com/office/drawing/2014/main" id="{2C61293E-6EBE-43EF-A52C-9BEBFD7679D4}"/>
+              </a:ext>
+              <a:ext uri="{C183D7F6-B498-43B3-948B-1728B52AA6E4}">
+                <adec:decorative xmlns:adec="http://schemas.microsoft.com/office/drawing/2017/decorative" val="1"/>
+              </a:ext>
+            </a:extLst>
+          </p:cNvPr>
+          <p:cNvSpPr>
+            <a:spLocks noGrp="1" noRot="1" noChangeAspect="1" noMove="1" noResize="1" noEditPoints="1" noAdjustHandles="1" noChangeArrowheads="1" noChangeShapeType="1" noTextEdit="1"/>
+          </p:cNvSpPr>
+          <p:nvPr>
+            <p:extLst>
+              <p:ext uri="{386F3935-93C4-4BCD-93E2-E3B085C9AB24}">
+                <p16:designElem xmlns:p16="http://schemas.microsoft.com/office/powerpoint/2015/main" val="1"/>
+              </p:ext>
+            </p:extLst>
+          </p:nvPr>
+        </p:nvSpPr>
+        <p:spPr>
+          <a:xfrm>
+            <a:off x="0" y="0"/>
+            <a:ext cx="12188952" cy="6858000"/>
+          </a:xfrm>
+          <a:prstGeom prst="rect">
+            <a:avLst/>
+          </a:prstGeom>
+          <a:ln>
+            <a:noFill/>
+          </a:ln>
+        </p:spPr>
+        <p:style>
+          <a:lnRef idx="2">
+            <a:schemeClr val="accent1">
+              <a:shade val="50000"/>
+            </a:schemeClr>
+          </a:lnRef>
+          <a:fillRef idx="1">
+            <a:schemeClr val="accent1"/>
+          </a:fillRef>
+          <a:effectRef idx="0">
+            <a:schemeClr val="accent1"/>
+          </a:effectRef>
+          <a:fontRef idx="minor">
+            <a:schemeClr val="lt1"/>
+          </a:fontRef>
+        </p:style>
+        <p:txBody>
+          <a:bodyPr rtlCol="0" anchor="ctr"/>
+          <a:lstStyle/>
+          <a:p>
+            <a:pPr algn="ctr"/>
             <a:endParaRPr lang="en-US"/>
           </a:p>
         </p:txBody>
@@ -10944,15 +10927,15 @@
         </p:nvSpPr>
         <p:spPr>
           <a:xfrm>
-            <a:off x="1026691" y="413230"/>
-            <a:ext cx="9886950" cy="722939"/>
+            <a:off x="2308010" y="198999"/>
+            <a:ext cx="7744968" cy="905256"/>
           </a:xfrm>
           <a:prstGeom prst="rect">
             <a:avLst/>
           </a:prstGeom>
         </p:spPr>
         <p:txBody>
-          <a:bodyPr>
+          <a:bodyPr vert="horz" lIns="91440" tIns="45720" rIns="91440" bIns="45720" rtlCol="0" anchor="b">
             <a:noAutofit/>
           </a:bodyPr>
           <a:lstStyle>
@@ -10975,11 +10958,499 @@
             </a:lvl1pPr>
           </a:lstStyle>
           <a:p>
+            <a:pPr algn="ctr">
+              <a:spcAft>
+                <a:spcPts val="600"/>
+              </a:spcAft>
+            </a:pPr>
+            <a:r>
+              <a:rPr lang="en-US" b="1" dirty="0"/>
+              <a:t>Questions &amp; Recommendations</a:t>
+            </a:r>
+          </a:p>
+        </p:txBody>
+      </p:sp>
+      <p:pic>
+        <p:nvPicPr>
+          <p:cNvPr id="8" name="Picture 7">
+            <a:extLst>
+              <a:ext uri="{FF2B5EF4-FFF2-40B4-BE49-F238E27FC236}">
+                <a16:creationId xmlns:a16="http://schemas.microsoft.com/office/drawing/2014/main" id="{6C862195-07AB-4C9C-ABE5-3ED79CD7588B}"/>
+              </a:ext>
+            </a:extLst>
+          </p:cNvPr>
+          <p:cNvPicPr>
+            <a:picLocks noChangeAspect="1"/>
+          </p:cNvPicPr>
+          <p:nvPr/>
+        </p:nvPicPr>
+        <p:blipFill rotWithShape="1">
+          <a:blip r:embed="rId2"/>
+          <a:srcRect r="3" b="1050"/>
+          <a:stretch/>
+        </p:blipFill>
+        <p:spPr>
+          <a:xfrm>
+            <a:off x="643128" y="1141249"/>
+            <a:ext cx="3428999" cy="5049239"/>
+          </a:xfrm>
+          <a:custGeom>
+            <a:avLst/>
+            <a:gdLst/>
+            <a:ahLst/>
+            <a:cxnLst/>
+            <a:rect l="l" t="t" r="r" b="b"/>
+            <a:pathLst>
+              <a:path w="4657344" h="6858000">
+                <a:moveTo>
+                  <a:pt x="0" y="0"/>
+                </a:moveTo>
+                <a:lnTo>
+                  <a:pt x="3429755" y="0"/>
+                </a:lnTo>
+                <a:lnTo>
+                  <a:pt x="3526016" y="148742"/>
+                </a:lnTo>
+                <a:cubicBezTo>
+                  <a:pt x="3657740" y="365513"/>
+                  <a:pt x="3777402" y="589569"/>
+                  <a:pt x="3886489" y="819975"/>
+                </a:cubicBezTo>
+                <a:cubicBezTo>
+                  <a:pt x="3891856" y="833492"/>
+                  <a:pt x="3900663" y="845393"/>
+                  <a:pt x="3912049" y="854514"/>
+                </a:cubicBezTo>
+                <a:cubicBezTo>
+                  <a:pt x="3897352" y="819849"/>
+                  <a:pt x="3883037" y="784928"/>
+                  <a:pt x="3868083" y="750263"/>
+                </a:cubicBezTo>
+                <a:cubicBezTo>
+                  <a:pt x="3806989" y="608712"/>
+                  <a:pt x="3742478" y="469145"/>
+                  <a:pt x="3674155" y="331786"/>
+                </a:cubicBezTo>
+                <a:lnTo>
+                  <a:pt x="3496656" y="0"/>
+                </a:lnTo>
+                <a:lnTo>
+                  <a:pt x="3554371" y="0"/>
+                </a:lnTo>
+                <a:lnTo>
+                  <a:pt x="3661621" y="196614"/>
+                </a:lnTo>
+                <a:cubicBezTo>
+                  <a:pt x="3856899" y="573253"/>
+                  <a:pt x="4021071" y="966066"/>
+                  <a:pt x="4161279" y="1371196"/>
+                </a:cubicBezTo>
+                <a:cubicBezTo>
+                  <a:pt x="4379525" y="2007265"/>
+                  <a:pt x="4530141" y="2664286"/>
+                  <a:pt x="4610660" y="3331516"/>
+                </a:cubicBezTo>
+                <a:cubicBezTo>
+                  <a:pt x="4652837" y="3672965"/>
+                  <a:pt x="4671625" y="4013908"/>
+                  <a:pt x="4645040" y="4357388"/>
+                </a:cubicBezTo>
+                <a:cubicBezTo>
+                  <a:pt x="4613599" y="4758899"/>
+                  <a:pt x="4566181" y="5157998"/>
+                  <a:pt x="4485789" y="5552906"/>
+                </a:cubicBezTo>
+                <a:cubicBezTo>
+                  <a:pt x="4397121" y="5988893"/>
+                  <a:pt x="4276748" y="6414594"/>
+                  <a:pt x="4117769" y="6828295"/>
+                </a:cubicBezTo>
+                <a:lnTo>
+                  <a:pt x="4105288" y="6858000"/>
+                </a:lnTo>
+                <a:lnTo>
+                  <a:pt x="4052520" y="6858000"/>
+                </a:lnTo>
+                <a:lnTo>
+                  <a:pt x="4059369" y="6841549"/>
+                </a:lnTo>
+                <a:cubicBezTo>
+                  <a:pt x="4147276" y="6614016"/>
+                  <a:pt x="4224193" y="6380817"/>
+                  <a:pt x="4291518" y="6142729"/>
+                </a:cubicBezTo>
+                <a:cubicBezTo>
+                  <a:pt x="4350055" y="5935370"/>
+                  <a:pt x="4393256" y="5723695"/>
+                  <a:pt x="4443357" y="5513923"/>
+                </a:cubicBezTo>
+                <a:cubicBezTo>
+                  <a:pt x="4444541" y="5502788"/>
+                  <a:pt x="4445137" y="5491601"/>
+                  <a:pt x="4445146" y="5480401"/>
+                </a:cubicBezTo>
+                <a:cubicBezTo>
+                  <a:pt x="4408465" y="5607635"/>
+                  <a:pt x="4379196" y="5719759"/>
+                  <a:pt x="4344559" y="5830359"/>
+                </a:cubicBezTo>
+                <a:cubicBezTo>
+                  <a:pt x="4254261" y="6118381"/>
+                  <a:pt x="4150112" y="6398531"/>
+                  <a:pt x="4031702" y="6670527"/>
+                </a:cubicBezTo>
+                <a:lnTo>
+                  <a:pt x="3943824" y="6858000"/>
+                </a:lnTo>
+                <a:lnTo>
+                  <a:pt x="0" y="6858000"/>
+                </a:lnTo>
+                <a:close/>
+              </a:path>
+            </a:pathLst>
+          </a:custGeom>
+        </p:spPr>
+      </p:pic>
+      <p:sp>
+        <p:nvSpPr>
+          <p:cNvPr id="15" name="sketchy line">
+            <a:extLst>
+              <a:ext uri="{FF2B5EF4-FFF2-40B4-BE49-F238E27FC236}">
+                <a16:creationId xmlns:a16="http://schemas.microsoft.com/office/drawing/2014/main" id="{21540236-BFD5-4A9D-8840-4703E7F76825}"/>
+              </a:ext>
+              <a:ext uri="{C183D7F6-B498-43B3-948B-1728B52AA6E4}">
+                <adec:decorative xmlns:adec="http://schemas.microsoft.com/office/drawing/2017/decorative" val="1"/>
+              </a:ext>
+            </a:extLst>
+          </p:cNvPr>
+          <p:cNvSpPr>
+            <a:spLocks noGrp="1" noRot="1" noChangeAspect="1" noMove="1" noResize="1" noEditPoints="1" noAdjustHandles="1" noChangeArrowheads="1" noChangeShapeType="1" noTextEdit="1"/>
+          </p:cNvSpPr>
+          <p:nvPr>
+            <p:extLst>
+              <p:ext uri="{386F3935-93C4-4BCD-93E2-E3B085C9AB24}">
+                <p16:designElem xmlns:p16="http://schemas.microsoft.com/office/powerpoint/2015/main" val="1"/>
+              </p:ext>
+            </p:extLst>
+          </p:nvPr>
+        </p:nvSpPr>
+        <p:spPr>
+          <a:xfrm>
+            <a:off x="5297762" y="2374947"/>
+            <a:ext cx="4243589" cy="18288"/>
+          </a:xfrm>
+          <a:custGeom>
+            <a:avLst/>
+            <a:gdLst>
+              <a:gd name="connsiteX0" fmla="*/ 0 w 4243589"/>
+              <a:gd name="connsiteY0" fmla="*/ 0 h 18288"/>
+              <a:gd name="connsiteX1" fmla="*/ 478919 w 4243589"/>
+              <a:gd name="connsiteY1" fmla="*/ 0 h 18288"/>
+              <a:gd name="connsiteX2" fmla="*/ 957839 w 4243589"/>
+              <a:gd name="connsiteY2" fmla="*/ 0 h 18288"/>
+              <a:gd name="connsiteX3" fmla="*/ 1521630 w 4243589"/>
+              <a:gd name="connsiteY3" fmla="*/ 0 h 18288"/>
+              <a:gd name="connsiteX4" fmla="*/ 2212729 w 4243589"/>
+              <a:gd name="connsiteY4" fmla="*/ 0 h 18288"/>
+              <a:gd name="connsiteX5" fmla="*/ 2734084 w 4243589"/>
+              <a:gd name="connsiteY5" fmla="*/ 0 h 18288"/>
+              <a:gd name="connsiteX6" fmla="*/ 3255439 w 4243589"/>
+              <a:gd name="connsiteY6" fmla="*/ 0 h 18288"/>
+              <a:gd name="connsiteX7" fmla="*/ 4243589 w 4243589"/>
+              <a:gd name="connsiteY7" fmla="*/ 0 h 18288"/>
+              <a:gd name="connsiteX8" fmla="*/ 4243589 w 4243589"/>
+              <a:gd name="connsiteY8" fmla="*/ 18288 h 18288"/>
+              <a:gd name="connsiteX9" fmla="*/ 3594926 w 4243589"/>
+              <a:gd name="connsiteY9" fmla="*/ 18288 h 18288"/>
+              <a:gd name="connsiteX10" fmla="*/ 3073571 w 4243589"/>
+              <a:gd name="connsiteY10" fmla="*/ 18288 h 18288"/>
+              <a:gd name="connsiteX11" fmla="*/ 2552216 w 4243589"/>
+              <a:gd name="connsiteY11" fmla="*/ 18288 h 18288"/>
+              <a:gd name="connsiteX12" fmla="*/ 1903553 w 4243589"/>
+              <a:gd name="connsiteY12" fmla="*/ 18288 h 18288"/>
+              <a:gd name="connsiteX13" fmla="*/ 1212454 w 4243589"/>
+              <a:gd name="connsiteY13" fmla="*/ 18288 h 18288"/>
+              <a:gd name="connsiteX14" fmla="*/ 733535 w 4243589"/>
+              <a:gd name="connsiteY14" fmla="*/ 18288 h 18288"/>
+              <a:gd name="connsiteX15" fmla="*/ 0 w 4243589"/>
+              <a:gd name="connsiteY15" fmla="*/ 18288 h 18288"/>
+              <a:gd name="connsiteX16" fmla="*/ 0 w 4243589"/>
+              <a:gd name="connsiteY16" fmla="*/ 0 h 18288"/>
+            </a:gdLst>
+            <a:ahLst/>
+            <a:cxnLst>
+              <a:cxn ang="0">
+                <a:pos x="connsiteX0" y="connsiteY0"/>
+              </a:cxn>
+              <a:cxn ang="0">
+                <a:pos x="connsiteX1" y="connsiteY1"/>
+              </a:cxn>
+              <a:cxn ang="0">
+                <a:pos x="connsiteX2" y="connsiteY2"/>
+              </a:cxn>
+              <a:cxn ang="0">
+                <a:pos x="connsiteX3" y="connsiteY3"/>
+              </a:cxn>
+              <a:cxn ang="0">
+                <a:pos x="connsiteX4" y="connsiteY4"/>
+              </a:cxn>
+              <a:cxn ang="0">
+                <a:pos x="connsiteX5" y="connsiteY5"/>
+              </a:cxn>
+              <a:cxn ang="0">
+                <a:pos x="connsiteX6" y="connsiteY6"/>
+              </a:cxn>
+              <a:cxn ang="0">
+                <a:pos x="connsiteX7" y="connsiteY7"/>
+              </a:cxn>
+              <a:cxn ang="0">
+                <a:pos x="connsiteX8" y="connsiteY8"/>
+              </a:cxn>
+              <a:cxn ang="0">
+                <a:pos x="connsiteX9" y="connsiteY9"/>
+              </a:cxn>
+              <a:cxn ang="0">
+                <a:pos x="connsiteX10" y="connsiteY10"/>
+              </a:cxn>
+              <a:cxn ang="0">
+                <a:pos x="connsiteX11" y="connsiteY11"/>
+              </a:cxn>
+              <a:cxn ang="0">
+                <a:pos x="connsiteX12" y="connsiteY12"/>
+              </a:cxn>
+              <a:cxn ang="0">
+                <a:pos x="connsiteX13" y="connsiteY13"/>
+              </a:cxn>
+              <a:cxn ang="0">
+                <a:pos x="connsiteX14" y="connsiteY14"/>
+              </a:cxn>
+              <a:cxn ang="0">
+                <a:pos x="connsiteX15" y="connsiteY15"/>
+              </a:cxn>
+              <a:cxn ang="0">
+                <a:pos x="connsiteX16" y="connsiteY16"/>
+              </a:cxn>
+            </a:cxnLst>
+            <a:rect l="l" t="t" r="r" b="b"/>
+            <a:pathLst>
+              <a:path w="4243589" h="18288" fill="none" extrusionOk="0">
+                <a:moveTo>
+                  <a:pt x="0" y="0"/>
+                </a:moveTo>
+                <a:cubicBezTo>
+                  <a:pt x="213395" y="-21006"/>
+                  <a:pt x="307421" y="-18116"/>
+                  <a:pt x="478919" y="0"/>
+                </a:cubicBezTo>
+                <a:cubicBezTo>
+                  <a:pt x="650417" y="18116"/>
+                  <a:pt x="831092" y="-21237"/>
+                  <a:pt x="957839" y="0"/>
+                </a:cubicBezTo>
+                <a:cubicBezTo>
+                  <a:pt x="1084586" y="21237"/>
+                  <a:pt x="1301682" y="25124"/>
+                  <a:pt x="1521630" y="0"/>
+                </a:cubicBezTo>
+                <a:cubicBezTo>
+                  <a:pt x="1741578" y="-25124"/>
+                  <a:pt x="1970269" y="-29139"/>
+                  <a:pt x="2212729" y="0"/>
+                </a:cubicBezTo>
+                <a:cubicBezTo>
+                  <a:pt x="2455189" y="29139"/>
+                  <a:pt x="2558847" y="-4796"/>
+                  <a:pt x="2734084" y="0"/>
+                </a:cubicBezTo>
+                <a:cubicBezTo>
+                  <a:pt x="2909321" y="4796"/>
+                  <a:pt x="3097217" y="-13409"/>
+                  <a:pt x="3255439" y="0"/>
+                </a:cubicBezTo>
+                <a:cubicBezTo>
+                  <a:pt x="3413662" y="13409"/>
+                  <a:pt x="3979999" y="-10121"/>
+                  <a:pt x="4243589" y="0"/>
+                </a:cubicBezTo>
+                <a:cubicBezTo>
+                  <a:pt x="4244484" y="8974"/>
+                  <a:pt x="4243043" y="9359"/>
+                  <a:pt x="4243589" y="18288"/>
+                </a:cubicBezTo>
+                <a:cubicBezTo>
+                  <a:pt x="4058777" y="31246"/>
+                  <a:pt x="3910348" y="3158"/>
+                  <a:pt x="3594926" y="18288"/>
+                </a:cubicBezTo>
+                <a:cubicBezTo>
+                  <a:pt x="3279504" y="33418"/>
+                  <a:pt x="3319955" y="-3977"/>
+                  <a:pt x="3073571" y="18288"/>
+                </a:cubicBezTo>
+                <a:cubicBezTo>
+                  <a:pt x="2827187" y="40553"/>
+                  <a:pt x="2767387" y="1863"/>
+                  <a:pt x="2552216" y="18288"/>
+                </a:cubicBezTo>
+                <a:cubicBezTo>
+                  <a:pt x="2337046" y="34713"/>
+                  <a:pt x="2181871" y="19527"/>
+                  <a:pt x="1903553" y="18288"/>
+                </a:cubicBezTo>
+                <a:cubicBezTo>
+                  <a:pt x="1625235" y="17049"/>
+                  <a:pt x="1557672" y="24174"/>
+                  <a:pt x="1212454" y="18288"/>
+                </a:cubicBezTo>
+                <a:cubicBezTo>
+                  <a:pt x="867236" y="12402"/>
+                  <a:pt x="874382" y="15627"/>
+                  <a:pt x="733535" y="18288"/>
+                </a:cubicBezTo>
+                <a:cubicBezTo>
+                  <a:pt x="592688" y="20949"/>
+                  <a:pt x="183477" y="14753"/>
+                  <a:pt x="0" y="18288"/>
+                </a:cubicBezTo>
+                <a:cubicBezTo>
+                  <a:pt x="-229" y="14222"/>
+                  <a:pt x="509" y="5816"/>
+                  <a:pt x="0" y="0"/>
+                </a:cubicBezTo>
+                <a:close/>
+              </a:path>
+              <a:path w="4243589" h="18288" stroke="0" extrusionOk="0">
+                <a:moveTo>
+                  <a:pt x="0" y="0"/>
+                </a:moveTo>
+                <a:cubicBezTo>
+                  <a:pt x="143690" y="16630"/>
+                  <a:pt x="266667" y="14847"/>
+                  <a:pt x="521355" y="0"/>
+                </a:cubicBezTo>
+                <a:cubicBezTo>
+                  <a:pt x="776043" y="-14847"/>
+                  <a:pt x="814491" y="-17363"/>
+                  <a:pt x="1000275" y="0"/>
+                </a:cubicBezTo>
+                <a:cubicBezTo>
+                  <a:pt x="1186059" y="17363"/>
+                  <a:pt x="1352504" y="-23507"/>
+                  <a:pt x="1521630" y="0"/>
+                </a:cubicBezTo>
+                <a:cubicBezTo>
+                  <a:pt x="1690756" y="23507"/>
+                  <a:pt x="1889525" y="5871"/>
+                  <a:pt x="2127857" y="0"/>
+                </a:cubicBezTo>
+                <a:cubicBezTo>
+                  <a:pt x="2366189" y="-5871"/>
+                  <a:pt x="2620628" y="-27997"/>
+                  <a:pt x="2776520" y="0"/>
+                </a:cubicBezTo>
+                <a:cubicBezTo>
+                  <a:pt x="2932412" y="27997"/>
+                  <a:pt x="3131683" y="-25073"/>
+                  <a:pt x="3467618" y="0"/>
+                </a:cubicBezTo>
+                <a:cubicBezTo>
+                  <a:pt x="3803553" y="25073"/>
+                  <a:pt x="4017371" y="3071"/>
+                  <a:pt x="4243589" y="0"/>
+                </a:cubicBezTo>
+                <a:cubicBezTo>
+                  <a:pt x="4243134" y="6162"/>
+                  <a:pt x="4243492" y="11775"/>
+                  <a:pt x="4243589" y="18288"/>
+                </a:cubicBezTo>
+                <a:cubicBezTo>
+                  <a:pt x="4017834" y="-5779"/>
+                  <a:pt x="3834586" y="13376"/>
+                  <a:pt x="3594926" y="18288"/>
+                </a:cubicBezTo>
+                <a:cubicBezTo>
+                  <a:pt x="3355266" y="23200"/>
+                  <a:pt x="3204179" y="2869"/>
+                  <a:pt x="2903827" y="18288"/>
+                </a:cubicBezTo>
+                <a:cubicBezTo>
+                  <a:pt x="2603475" y="33707"/>
+                  <a:pt x="2526187" y="46187"/>
+                  <a:pt x="2212729" y="18288"/>
+                </a:cubicBezTo>
+                <a:cubicBezTo>
+                  <a:pt x="1899271" y="-9611"/>
+                  <a:pt x="1966289" y="29692"/>
+                  <a:pt x="1733809" y="18288"/>
+                </a:cubicBezTo>
+                <a:cubicBezTo>
+                  <a:pt x="1501329" y="6884"/>
+                  <a:pt x="1343612" y="12492"/>
+                  <a:pt x="1085146" y="18288"/>
+                </a:cubicBezTo>
+                <a:cubicBezTo>
+                  <a:pt x="826680" y="24084"/>
+                  <a:pt x="778184" y="35607"/>
+                  <a:pt x="521355" y="18288"/>
+                </a:cubicBezTo>
+                <a:cubicBezTo>
+                  <a:pt x="264526" y="969"/>
+                  <a:pt x="120277" y="4268"/>
+                  <a:pt x="0" y="18288"/>
+                </a:cubicBezTo>
+                <a:cubicBezTo>
+                  <a:pt x="766" y="10800"/>
+                  <a:pt x="-457" y="8180"/>
+                  <a:pt x="0" y="0"/>
+                </a:cubicBezTo>
+                <a:close/>
+              </a:path>
+            </a:pathLst>
+          </a:custGeom>
+          <a:solidFill>
+            <a:schemeClr val="accent2"/>
+          </a:solidFill>
+          <a:ln w="44450" cap="rnd">
+            <a:solidFill>
+              <a:schemeClr val="accent2"/>
+            </a:solidFill>
+            <a:round/>
+            <a:extLst>
+              <a:ext uri="{C807C97D-BFC1-408E-A445-0C87EB9F89A2}">
+                <ask:lineSketchStyleProps xmlns:ask="http://schemas.microsoft.com/office/drawing/2018/sketchyshapes" sd="2727557108">
+                  <a:prstGeom prst="rect">
+                    <a:avLst/>
+                  </a:prstGeom>
+                  <ask:type>
+                    <ask:lineSketchFreehand/>
+                  </ask:type>
+                </ask:lineSketchStyleProps>
+              </a:ext>
+            </a:extLst>
+          </a:ln>
+        </p:spPr>
+        <p:style>
+          <a:lnRef idx="2">
+            <a:schemeClr val="accent1">
+              <a:shade val="50000"/>
+            </a:schemeClr>
+          </a:lnRef>
+          <a:fillRef idx="1">
+            <a:schemeClr val="accent1"/>
+          </a:fillRef>
+          <a:effectRef idx="0">
+            <a:schemeClr val="accent1"/>
+          </a:effectRef>
+          <a:fontRef idx="minor">
+            <a:schemeClr val="lt1"/>
+          </a:fontRef>
+        </p:style>
+        <p:txBody>
+          <a:bodyPr rtlCol="0" anchor="ctr"/>
+          <a:lstStyle/>
+          <a:p>
             <a:pPr algn="ctr"/>
-            <a:r>
-              <a:rPr lang="en-US" sz="3600" b="1" dirty="0"/>
-              <a:t>Recommended Future Analysis </a:t>
-            </a:r>
+            <a:endParaRPr lang="en-US"/>
           </a:p>
         </p:txBody>
       </p:sp>
@@ -10999,16 +11470,16 @@
         </p:nvSpPr>
         <p:spPr>
           <a:xfrm>
-            <a:off x="516360" y="1815589"/>
-            <a:ext cx="9886950" cy="1707787"/>
+            <a:off x="5157216" y="2660904"/>
+            <a:ext cx="6391656" cy="3529584"/>
           </a:xfrm>
           <a:prstGeom prst="rect">
             <a:avLst/>
           </a:prstGeom>
         </p:spPr>
         <p:txBody>
-          <a:bodyPr>
-            <a:noAutofit/>
+          <a:bodyPr vert="horz" lIns="91440" tIns="45720" rIns="91440" bIns="45720" rtlCol="0">
+            <a:normAutofit/>
           </a:bodyPr>
           <a:lstStyle>
             <a:lvl1pPr algn="l" defTabSz="914400" rtl="0" eaLnBrk="1" latinLnBrk="0" hangingPunct="1">
@@ -11030,62 +11501,340 @@
             </a:lvl1pPr>
           </a:lstStyle>
           <a:p>
-            <a:pPr marL="342900" indent="-342900">
+            <a:pPr marL="342900" indent="-228600">
+              <a:lnSpc>
+                <a:spcPct val="100000"/>
+              </a:lnSpc>
+              <a:spcAft>
+                <a:spcPts val="600"/>
+              </a:spcAft>
               <a:buFont typeface="Arial" panose="020B0604020202020204" pitchFamily="34" charset="0"/>
               <a:buChar char="•"/>
             </a:pPr>
             <a:r>
-              <a:rPr lang="en-US" sz="2400" dirty="0"/>
+              <a:rPr lang="en-US" sz="2800" dirty="0">
+                <a:latin typeface="+mn-lt"/>
+                <a:ea typeface="+mn-ea"/>
+                <a:cs typeface="+mn-cs"/>
+              </a:rPr>
               <a:t>Use updated data reports</a:t>
             </a:r>
           </a:p>
           <a:p>
-            <a:pPr marL="342900" indent="-342900">
+            <a:pPr marL="342900" indent="-228600">
+              <a:lnSpc>
+                <a:spcPct val="100000"/>
+              </a:lnSpc>
+              <a:spcAft>
+                <a:spcPts val="600"/>
+              </a:spcAft>
               <a:buFont typeface="Arial" panose="020B0604020202020204" pitchFamily="34" charset="0"/>
               <a:buChar char="•"/>
             </a:pPr>
             <a:r>
-              <a:rPr lang="en-US" sz="2400" dirty="0"/>
+              <a:rPr lang="en-US" sz="2800" dirty="0">
+                <a:latin typeface="+mn-lt"/>
+                <a:ea typeface="+mn-ea"/>
+                <a:cs typeface="+mn-cs"/>
+              </a:rPr>
               <a:t>Further cleanup of country names</a:t>
             </a:r>
           </a:p>
           <a:p>
-            <a:pPr marL="342900" indent="-342900">
+            <a:pPr marL="342900" indent="-228600">
+              <a:lnSpc>
+                <a:spcPct val="100000"/>
+              </a:lnSpc>
+              <a:spcAft>
+                <a:spcPts val="600"/>
+              </a:spcAft>
               <a:buFont typeface="Arial" panose="020B0604020202020204" pitchFamily="34" charset="0"/>
               <a:buChar char="•"/>
             </a:pPr>
             <a:r>
-              <a:rPr lang="en-US" sz="2400" dirty="0"/>
+              <a:rPr lang="en-US" sz="2800" dirty="0">
+                <a:latin typeface="+mn-lt"/>
+                <a:ea typeface="+mn-ea"/>
+                <a:cs typeface="+mn-cs"/>
+              </a:rPr>
               <a:t>Segregate non-reporting or limited reporting countries</a:t>
             </a:r>
           </a:p>
           <a:p>
-            <a:pPr marL="342900" indent="-342900">
+            <a:pPr marL="114300">
+              <a:lnSpc>
+                <a:spcPct val="100000"/>
+              </a:lnSpc>
+              <a:spcAft>
+                <a:spcPts val="600"/>
+              </a:spcAft>
+            </a:pPr>
+            <a:endParaRPr lang="en-US" sz="2800" dirty="0">
+              <a:latin typeface="+mn-lt"/>
+              <a:ea typeface="+mn-ea"/>
+              <a:cs typeface="+mn-cs"/>
+            </a:endParaRPr>
+          </a:p>
+          <a:p>
+            <a:pPr marL="342900" indent="-228600">
+              <a:lnSpc>
+                <a:spcPct val="100000"/>
+              </a:lnSpc>
+              <a:spcAft>
+                <a:spcPts val="600"/>
+              </a:spcAft>
               <a:buFont typeface="Arial" panose="020B0604020202020204" pitchFamily="34" charset="0"/>
               <a:buChar char="•"/>
             </a:pPr>
-            <a:r>
-              <a:rPr lang="en-US" sz="2400"/>
-              <a:t>…………</a:t>
-            </a:r>
-            <a:endParaRPr lang="en-US" sz="2400" dirty="0"/>
-          </a:p>
-          <a:p>
-            <a:pPr marL="342900" indent="-342900">
+            <a:endParaRPr lang="en-US" sz="2800" dirty="0">
+              <a:latin typeface="+mn-lt"/>
+              <a:ea typeface="+mn-ea"/>
+              <a:cs typeface="+mn-cs"/>
+            </a:endParaRPr>
+          </a:p>
+          <a:p>
+            <a:pPr indent="-228600">
+              <a:lnSpc>
+                <a:spcPct val="100000"/>
+              </a:lnSpc>
+              <a:spcAft>
+                <a:spcPts val="600"/>
+              </a:spcAft>
               <a:buFont typeface="Arial" panose="020B0604020202020204" pitchFamily="34" charset="0"/>
               <a:buChar char="•"/>
             </a:pPr>
-            <a:endParaRPr lang="en-US" sz="2400" dirty="0"/>
-          </a:p>
-          <a:p>
-            <a:endParaRPr lang="en-US" sz="2400" dirty="0"/>
-          </a:p>
-          <a:p>
-            <a:pPr marL="342900" indent="-342900">
+            <a:endParaRPr lang="en-US" sz="2800" dirty="0">
+              <a:latin typeface="+mn-lt"/>
+              <a:ea typeface="+mn-ea"/>
+              <a:cs typeface="+mn-cs"/>
+            </a:endParaRPr>
+          </a:p>
+          <a:p>
+            <a:pPr marL="342900" indent="-228600">
+              <a:lnSpc>
+                <a:spcPct val="100000"/>
+              </a:lnSpc>
+              <a:spcAft>
+                <a:spcPts val="600"/>
+              </a:spcAft>
               <a:buFont typeface="Arial" panose="020B0604020202020204" pitchFamily="34" charset="0"/>
               <a:buChar char="•"/>
             </a:pPr>
-            <a:endParaRPr lang="en-US" sz="2400" dirty="0"/>
+            <a:endParaRPr lang="en-US" sz="2800" dirty="0">
+              <a:latin typeface="+mn-lt"/>
+              <a:ea typeface="+mn-ea"/>
+              <a:cs typeface="+mn-cs"/>
+            </a:endParaRPr>
+          </a:p>
+        </p:txBody>
+      </p:sp>
+      <p:sp>
+        <p:nvSpPr>
+          <p:cNvPr id="2" name="Date Placeholder 1">
+            <a:extLst>
+              <a:ext uri="{FF2B5EF4-FFF2-40B4-BE49-F238E27FC236}">
+                <a16:creationId xmlns:a16="http://schemas.microsoft.com/office/drawing/2014/main" id="{CE5DB7E6-95CC-4B40-B5A1-52F98B971718}"/>
+              </a:ext>
+            </a:extLst>
+          </p:cNvPr>
+          <p:cNvSpPr>
+            <a:spLocks noGrp="1"/>
+          </p:cNvSpPr>
+          <p:nvPr>
+            <p:ph type="dt" sz="half" idx="10"/>
+          </p:nvPr>
+        </p:nvSpPr>
+        <p:spPr>
+          <a:xfrm>
+            <a:off x="838200" y="6356350"/>
+            <a:ext cx="2743200" cy="365125"/>
+          </a:xfrm>
+        </p:spPr>
+        <p:txBody>
+          <a:bodyPr vert="horz" lIns="91440" tIns="45720" rIns="91440" bIns="45720" rtlCol="0" anchor="ctr">
+            <a:normAutofit/>
+          </a:bodyPr>
+          <a:lstStyle/>
+          <a:p>
+            <a:pPr>
+              <a:spcAft>
+                <a:spcPts val="600"/>
+              </a:spcAft>
+              <a:defRPr/>
+            </a:pPr>
+            <a:r>
+              <a:rPr lang="en-US">
+                <a:solidFill>
+                  <a:srgbClr val="FFFFFF"/>
+                </a:solidFill>
+                <a:latin typeface="Calibri" panose="020F0502020204030204"/>
+              </a:rPr>
+              <a:t>6/9/2021</a:t>
+            </a:r>
+          </a:p>
+        </p:txBody>
+      </p:sp>
+      <p:sp>
+        <p:nvSpPr>
+          <p:cNvPr id="3" name="Footer Placeholder 2">
+            <a:extLst>
+              <a:ext uri="{FF2B5EF4-FFF2-40B4-BE49-F238E27FC236}">
+                <a16:creationId xmlns:a16="http://schemas.microsoft.com/office/drawing/2014/main" id="{F9C71061-44F4-4298-A2F1-DB7F955F92C4}"/>
+              </a:ext>
+            </a:extLst>
+          </p:cNvPr>
+          <p:cNvSpPr>
+            <a:spLocks noGrp="1"/>
+          </p:cNvSpPr>
+          <p:nvPr>
+            <p:ph type="ftr" sz="quarter" idx="11"/>
+          </p:nvPr>
+        </p:nvSpPr>
+        <p:spPr>
+          <a:xfrm>
+            <a:off x="5297762" y="6356350"/>
+            <a:ext cx="4114800" cy="365125"/>
+          </a:xfrm>
+        </p:spPr>
+        <p:txBody>
+          <a:bodyPr vert="horz" lIns="91440" tIns="45720" rIns="91440" bIns="45720" rtlCol="0" anchor="ctr">
+            <a:normAutofit/>
+          </a:bodyPr>
+          <a:lstStyle/>
+          <a:p>
+            <a:pPr algn="l">
+              <a:spcAft>
+                <a:spcPts val="600"/>
+              </a:spcAft>
+              <a:defRPr/>
+            </a:pPr>
+            <a:r>
+              <a:rPr lang="en-US" kern="1200">
+                <a:solidFill>
+                  <a:prstClr val="black">
+                    <a:tint val="75000"/>
+                  </a:prstClr>
+                </a:solidFill>
+                <a:latin typeface="Calibri" panose="020F0502020204030204"/>
+                <a:ea typeface="+mn-ea"/>
+                <a:cs typeface="+mn-cs"/>
+              </a:rPr>
+              <a:t>https://github.com/makbarish/Grp5_Project1_Covid19</a:t>
+            </a:r>
+          </a:p>
+        </p:txBody>
+      </p:sp>
+      <p:sp>
+        <p:nvSpPr>
+          <p:cNvPr id="4" name="Slide Number Placeholder 3">
+            <a:extLst>
+              <a:ext uri="{FF2B5EF4-FFF2-40B4-BE49-F238E27FC236}">
+                <a16:creationId xmlns:a16="http://schemas.microsoft.com/office/drawing/2014/main" id="{6417783F-0E52-48D5-AAC7-F8904842DBBC}"/>
+              </a:ext>
+            </a:extLst>
+          </p:cNvPr>
+          <p:cNvSpPr>
+            <a:spLocks noGrp="1"/>
+          </p:cNvSpPr>
+          <p:nvPr>
+            <p:ph type="sldNum" sz="quarter" idx="12"/>
+          </p:nvPr>
+        </p:nvSpPr>
+        <p:spPr>
+          <a:xfrm>
+            <a:off x="10052978" y="6356350"/>
+            <a:ext cx="1300821" cy="365125"/>
+          </a:xfrm>
+        </p:spPr>
+        <p:txBody>
+          <a:bodyPr vert="horz" lIns="91440" tIns="45720" rIns="91440" bIns="45720" rtlCol="0" anchor="ctr">
+            <a:normAutofit/>
+          </a:bodyPr>
+          <a:lstStyle/>
+          <a:p>
+            <a:pPr>
+              <a:spcAft>
+                <a:spcPts val="600"/>
+              </a:spcAft>
+              <a:defRPr/>
+            </a:pPr>
+            <a:fld id="{3AA9003C-6A8E-4863-AB7A-EC3E1B799067}" type="slidenum">
+              <a:rPr lang="en-US" smtClean="0">
+                <a:solidFill>
+                  <a:prstClr val="black">
+                    <a:tint val="75000"/>
+                  </a:prstClr>
+                </a:solidFill>
+                <a:latin typeface="Calibri" panose="020F0502020204030204"/>
+              </a:rPr>
+              <a:pPr>
+                <a:spcAft>
+                  <a:spcPts val="600"/>
+                </a:spcAft>
+                <a:defRPr/>
+              </a:pPr>
+              <a:t>28</a:t>
+            </a:fld>
+            <a:endParaRPr lang="en-US">
+              <a:solidFill>
+                <a:prstClr val="black">
+                  <a:tint val="75000"/>
+                </a:prstClr>
+              </a:solidFill>
+              <a:latin typeface="Calibri" panose="020F0502020204030204"/>
+            </a:endParaRPr>
+          </a:p>
+        </p:txBody>
+      </p:sp>
+      <p:sp>
+        <p:nvSpPr>
+          <p:cNvPr id="12" name="TextBox 11">
+            <a:extLst>
+              <a:ext uri="{FF2B5EF4-FFF2-40B4-BE49-F238E27FC236}">
+                <a16:creationId xmlns:a16="http://schemas.microsoft.com/office/drawing/2014/main" id="{C7424706-AAA1-4FE0-9CF2-04CD99F65574}"/>
+              </a:ext>
+            </a:extLst>
+          </p:cNvPr>
+          <p:cNvSpPr txBox="1"/>
+          <p:nvPr/>
+        </p:nvSpPr>
+        <p:spPr>
+          <a:xfrm>
+            <a:off x="4209063" y="1771767"/>
+            <a:ext cx="6094602" cy="723275"/>
+          </a:xfrm>
+          <a:prstGeom prst="rect">
+            <a:avLst/>
+          </a:prstGeom>
+          <a:noFill/>
+        </p:spPr>
+        <p:txBody>
+          <a:bodyPr wrap="square">
+            <a:spAutoFit/>
+          </a:bodyPr>
+          <a:lstStyle/>
+          <a:p>
+            <a:pPr algn="ctr">
+              <a:spcAft>
+                <a:spcPts val="600"/>
+              </a:spcAft>
+            </a:pPr>
+            <a:r>
+              <a:rPr lang="en-US" sz="1800" b="1" dirty="0"/>
+              <a:t>Recommended Future Analysis </a:t>
+            </a:r>
+          </a:p>
+          <a:p>
+            <a:pPr algn="ctr">
+              <a:spcAft>
+                <a:spcPts val="600"/>
+              </a:spcAft>
+            </a:pPr>
+            <a:r>
+              <a:rPr lang="en-US" sz="1800" b="1" dirty="0"/>
+              <a:t> </a:t>
+            </a:r>
+            <a:endParaRPr lang="en-US" dirty="0"/>
           </a:p>
         </p:txBody>
       </p:sp>
@@ -11852,216 +12601,650 @@
           </a:p>
         </p:txBody>
       </p:sp>
-      <p:pic>
-        <p:nvPicPr>
-          <p:cNvPr id="5" name="Picture 4">
-            <a:extLst>
-              <a:ext uri="{FF2B5EF4-FFF2-40B4-BE49-F238E27FC236}">
-                <a16:creationId xmlns:a16="http://schemas.microsoft.com/office/drawing/2014/main" id="{CC497F15-0ECB-4058-ABF5-62C197E92CC4}"/>
-              </a:ext>
-            </a:extLst>
-          </p:cNvPr>
-          <p:cNvPicPr>
-            <a:picLocks noChangeAspect="1"/>
-          </p:cNvPicPr>
+      <p:grpSp>
+        <p:nvGrpSpPr>
+          <p:cNvPr id="6" name="Group 5">
+            <a:extLst>
+              <a:ext uri="{FF2B5EF4-FFF2-40B4-BE49-F238E27FC236}">
+                <a16:creationId xmlns:a16="http://schemas.microsoft.com/office/drawing/2014/main" id="{B97A4EA7-0D36-4690-98F7-D9A27437A3B6}"/>
+              </a:ext>
+            </a:extLst>
+          </p:cNvPr>
+          <p:cNvGrpSpPr/>
           <p:nvPr/>
-        </p:nvPicPr>
-        <p:blipFill>
-          <a:blip r:embed="rId2"/>
-          <a:stretch>
-            <a:fillRect/>
-          </a:stretch>
-        </p:blipFill>
+        </p:nvGrpSpPr>
+        <p:grpSpPr>
+          <a:xfrm>
+            <a:off x="452807" y="827074"/>
+            <a:ext cx="11115611" cy="5254944"/>
+            <a:chOff x="452807" y="827074"/>
+            <a:chExt cx="11596580" cy="5643192"/>
+          </a:xfrm>
+        </p:grpSpPr>
+        <p:pic>
+          <p:nvPicPr>
+            <p:cNvPr id="5" name="Picture 4">
+              <a:extLst>
+                <a:ext uri="{FF2B5EF4-FFF2-40B4-BE49-F238E27FC236}">
+                  <a16:creationId xmlns:a16="http://schemas.microsoft.com/office/drawing/2014/main" id="{CC497F15-0ECB-4058-ABF5-62C197E92CC4}"/>
+                </a:ext>
+              </a:extLst>
+            </p:cNvPr>
+            <p:cNvPicPr>
+              <a:picLocks noChangeAspect="1"/>
+            </p:cNvPicPr>
+            <p:nvPr/>
+          </p:nvPicPr>
+          <p:blipFill>
+            <a:blip r:embed="rId2"/>
+            <a:stretch>
+              <a:fillRect/>
+            </a:stretch>
+          </p:blipFill>
+          <p:spPr>
+            <a:xfrm>
+              <a:off x="452807" y="827074"/>
+              <a:ext cx="11286386" cy="5643192"/>
+            </a:xfrm>
+            <a:prstGeom prst="rect">
+              <a:avLst/>
+            </a:prstGeom>
+          </p:spPr>
+        </p:pic>
+        <p:cxnSp>
+          <p:nvCxnSpPr>
+            <p:cNvPr id="12" name="Straight Connector 11">
+              <a:extLst>
+                <a:ext uri="{FF2B5EF4-FFF2-40B4-BE49-F238E27FC236}">
+                  <a16:creationId xmlns:a16="http://schemas.microsoft.com/office/drawing/2014/main" id="{28183E56-8C91-4D07-B069-DCF6777EC2A8}"/>
+                </a:ext>
+              </a:extLst>
+            </p:cNvPr>
+            <p:cNvCxnSpPr>
+              <a:cxnSpLocks/>
+            </p:cNvCxnSpPr>
+            <p:nvPr/>
+          </p:nvCxnSpPr>
+          <p:spPr>
+            <a:xfrm>
+              <a:off x="7117359" y="4373026"/>
+              <a:ext cx="0" cy="1377086"/>
+            </a:xfrm>
+            <a:prstGeom prst="line">
+              <a:avLst/>
+            </a:prstGeom>
+            <a:ln>
+              <a:prstDash val="lgDashDotDot"/>
+            </a:ln>
+          </p:spPr>
+          <p:style>
+            <a:lnRef idx="1">
+              <a:schemeClr val="accent1"/>
+            </a:lnRef>
+            <a:fillRef idx="0">
+              <a:schemeClr val="accent1"/>
+            </a:fillRef>
+            <a:effectRef idx="0">
+              <a:schemeClr val="accent1"/>
+            </a:effectRef>
+            <a:fontRef idx="minor">
+              <a:schemeClr val="tx1"/>
+            </a:fontRef>
+          </p:style>
+        </p:cxnSp>
+        <p:cxnSp>
+          <p:nvCxnSpPr>
+            <p:cNvPr id="14" name="Straight Connector 13">
+              <a:extLst>
+                <a:ext uri="{FF2B5EF4-FFF2-40B4-BE49-F238E27FC236}">
+                  <a16:creationId xmlns:a16="http://schemas.microsoft.com/office/drawing/2014/main" id="{1ADFAFD7-F17B-45D1-AE2D-43C20CEAA64B}"/>
+                </a:ext>
+              </a:extLst>
+            </p:cNvPr>
+            <p:cNvCxnSpPr>
+              <a:cxnSpLocks/>
+            </p:cNvCxnSpPr>
+            <p:nvPr/>
+          </p:nvCxnSpPr>
+          <p:spPr>
+            <a:xfrm>
+              <a:off x="1835788" y="4363537"/>
+              <a:ext cx="5289960" cy="1"/>
+            </a:xfrm>
+            <a:prstGeom prst="line">
+              <a:avLst/>
+            </a:prstGeom>
+            <a:ln>
+              <a:prstDash val="lgDashDotDot"/>
+            </a:ln>
+          </p:spPr>
+          <p:style>
+            <a:lnRef idx="1">
+              <a:schemeClr val="accent1"/>
+            </a:lnRef>
+            <a:fillRef idx="0">
+              <a:schemeClr val="accent1"/>
+            </a:fillRef>
+            <a:effectRef idx="0">
+              <a:schemeClr val="accent1"/>
+            </a:effectRef>
+            <a:fontRef idx="minor">
+              <a:schemeClr val="tx1"/>
+            </a:fontRef>
+          </p:style>
+        </p:cxnSp>
+        <p:cxnSp>
+          <p:nvCxnSpPr>
+            <p:cNvPr id="22" name="Straight Connector 21">
+              <a:extLst>
+                <a:ext uri="{FF2B5EF4-FFF2-40B4-BE49-F238E27FC236}">
+                  <a16:creationId xmlns:a16="http://schemas.microsoft.com/office/drawing/2014/main" id="{07E921A9-0C08-419A-9E43-3526E046626B}"/>
+                </a:ext>
+              </a:extLst>
+            </p:cNvPr>
+            <p:cNvCxnSpPr>
+              <a:cxnSpLocks/>
+            </p:cNvCxnSpPr>
+            <p:nvPr/>
+          </p:nvCxnSpPr>
+          <p:spPr>
+            <a:xfrm flipV="1">
+              <a:off x="1835788" y="5203632"/>
+              <a:ext cx="5289960" cy="1"/>
+            </a:xfrm>
+            <a:prstGeom prst="line">
+              <a:avLst/>
+            </a:prstGeom>
+            <a:ln>
+              <a:prstDash val="lgDashDotDot"/>
+            </a:ln>
+          </p:spPr>
+          <p:style>
+            <a:lnRef idx="1">
+              <a:schemeClr val="accent1"/>
+            </a:lnRef>
+            <a:fillRef idx="0">
+              <a:schemeClr val="accent1"/>
+            </a:fillRef>
+            <a:effectRef idx="0">
+              <a:schemeClr val="accent1"/>
+            </a:effectRef>
+            <a:fontRef idx="minor">
+              <a:schemeClr val="tx1"/>
+            </a:fontRef>
+          </p:style>
+        </p:cxnSp>
+        <p:cxnSp>
+          <p:nvCxnSpPr>
+            <p:cNvPr id="26" name="Straight Connector 25">
+              <a:extLst>
+                <a:ext uri="{FF2B5EF4-FFF2-40B4-BE49-F238E27FC236}">
+                  <a16:creationId xmlns:a16="http://schemas.microsoft.com/office/drawing/2014/main" id="{3BFEDEAE-32FF-4FC8-A130-30D125E4294A}"/>
+                </a:ext>
+              </a:extLst>
+            </p:cNvPr>
+            <p:cNvCxnSpPr>
+              <a:cxnSpLocks/>
+            </p:cNvCxnSpPr>
+            <p:nvPr/>
+          </p:nvCxnSpPr>
+          <p:spPr>
+            <a:xfrm flipV="1">
+              <a:off x="1810622" y="4777054"/>
+              <a:ext cx="5289960" cy="1"/>
+            </a:xfrm>
+            <a:prstGeom prst="line">
+              <a:avLst/>
+            </a:prstGeom>
+            <a:ln>
+              <a:prstDash val="lgDashDotDot"/>
+            </a:ln>
+          </p:spPr>
+          <p:style>
+            <a:lnRef idx="1">
+              <a:schemeClr val="accent1"/>
+            </a:lnRef>
+            <a:fillRef idx="0">
+              <a:schemeClr val="accent1"/>
+            </a:fillRef>
+            <a:effectRef idx="0">
+              <a:schemeClr val="accent1"/>
+            </a:effectRef>
+            <a:fontRef idx="minor">
+              <a:schemeClr val="tx1"/>
+            </a:fontRef>
+          </p:style>
+        </p:cxnSp>
+        <p:sp>
+          <p:nvSpPr>
+            <p:cNvPr id="27" name="TextBox 26">
+              <a:extLst>
+                <a:ext uri="{FF2B5EF4-FFF2-40B4-BE49-F238E27FC236}">
+                  <a16:creationId xmlns:a16="http://schemas.microsoft.com/office/drawing/2014/main" id="{68130FF9-79BF-472B-90AA-1B351D2CDAEC}"/>
+                </a:ext>
+              </a:extLst>
+            </p:cNvPr>
+            <p:cNvSpPr txBox="1"/>
+            <p:nvPr/>
+          </p:nvSpPr>
+          <p:spPr>
+            <a:xfrm>
+              <a:off x="1886745" y="2738404"/>
+              <a:ext cx="6671697" cy="991548"/>
+            </a:xfrm>
+            <a:prstGeom prst="rect">
+              <a:avLst/>
+            </a:prstGeom>
+            <a:noFill/>
+          </p:spPr>
+          <p:txBody>
+            <a:bodyPr wrap="square" rtlCol="0">
+              <a:spAutoFit/>
+            </a:bodyPr>
+            <a:lstStyle/>
+            <a:p>
+              <a:r>
+                <a:rPr lang="en-US" dirty="0">
+                  <a:solidFill>
+                    <a:srgbClr val="0070C0"/>
+                  </a:solidFill>
+                  <a:latin typeface="Centaur" panose="02030504050205020304" pitchFamily="18" charset="0"/>
+                </a:rPr>
+                <a:t>Confirmed Cases </a:t>
+              </a:r>
+              <a:r>
+                <a:rPr lang="en-US" dirty="0">
+                  <a:latin typeface="Centaur" panose="02030504050205020304" pitchFamily="18" charset="0"/>
+                </a:rPr>
+                <a:t>=</a:t>
+              </a:r>
+              <a:r>
+                <a:rPr lang="en-US" dirty="0">
+                  <a:solidFill>
+                    <a:srgbClr val="0070C0"/>
+                  </a:solidFill>
+                  <a:latin typeface="Centaur" panose="02030504050205020304" pitchFamily="18" charset="0"/>
+                </a:rPr>
+                <a:t>  </a:t>
+              </a:r>
+              <a:r>
+                <a:rPr lang="en-US" dirty="0">
+                  <a:solidFill>
+                    <a:srgbClr val="FF0000"/>
+                  </a:solidFill>
+                  <a:latin typeface="Centaur" panose="02030504050205020304" pitchFamily="18" charset="0"/>
+                </a:rPr>
+                <a:t>Active Cases </a:t>
+              </a:r>
+              <a:r>
+                <a:rPr lang="en-US" dirty="0">
+                  <a:latin typeface="Centaur" panose="02030504050205020304" pitchFamily="18" charset="0"/>
+                </a:rPr>
+                <a:t>+</a:t>
+              </a:r>
+              <a:r>
+                <a:rPr lang="en-US" dirty="0">
+                  <a:solidFill>
+                    <a:srgbClr val="0070C0"/>
+                  </a:solidFill>
+                  <a:latin typeface="Centaur" panose="02030504050205020304" pitchFamily="18" charset="0"/>
+                </a:rPr>
+                <a:t>  </a:t>
+              </a:r>
+              <a:r>
+                <a:rPr lang="en-US" dirty="0">
+                  <a:solidFill>
+                    <a:srgbClr val="00B050"/>
+                  </a:solidFill>
+                  <a:latin typeface="Centaur" panose="02030504050205020304" pitchFamily="18" charset="0"/>
+                </a:rPr>
+                <a:t>Recovered Cases  </a:t>
+              </a:r>
+              <a:r>
+                <a:rPr lang="en-US" dirty="0">
+                  <a:latin typeface="Centaur" panose="02030504050205020304" pitchFamily="18" charset="0"/>
+                </a:rPr>
+                <a:t>+</a:t>
+              </a:r>
+              <a:r>
+                <a:rPr lang="en-US" dirty="0">
+                  <a:solidFill>
+                    <a:srgbClr val="0070C0"/>
+                  </a:solidFill>
+                  <a:latin typeface="Centaur" panose="02030504050205020304" pitchFamily="18" charset="0"/>
+                </a:rPr>
+                <a:t>     </a:t>
+              </a:r>
+              <a:r>
+                <a:rPr lang="en-US" dirty="0">
+                  <a:solidFill>
+                    <a:srgbClr val="FFC000"/>
+                  </a:solidFill>
+                  <a:latin typeface="Centaur" panose="02030504050205020304" pitchFamily="18" charset="0"/>
+                </a:rPr>
+                <a:t>Deaths</a:t>
+              </a:r>
+            </a:p>
+            <a:p>
+              <a:r>
+                <a:rPr lang="en-US" dirty="0">
+                  <a:solidFill>
+                    <a:srgbClr val="FFC000"/>
+                  </a:solidFill>
+                  <a:latin typeface="Centaur" panose="02030504050205020304" pitchFamily="18" charset="0"/>
+                </a:rPr>
+                <a:t>     </a:t>
+              </a:r>
+              <a:r>
+                <a:rPr lang="en-US" dirty="0">
+                  <a:solidFill>
+                    <a:srgbClr val="0070C0"/>
+                  </a:solidFill>
+                  <a:latin typeface="Centaur" panose="02030504050205020304" pitchFamily="18" charset="0"/>
+                </a:rPr>
+                <a:t>0.502e8 </a:t>
+              </a:r>
+              <a:r>
+                <a:rPr lang="en-US" dirty="0">
+                  <a:solidFill>
+                    <a:srgbClr val="FFC000"/>
+                  </a:solidFill>
+                  <a:latin typeface="Centaur" panose="02030504050205020304" pitchFamily="18" charset="0"/>
+                </a:rPr>
+                <a:t>        </a:t>
+              </a:r>
+              <a:r>
+                <a:rPr lang="en-US" dirty="0">
+                  <a:latin typeface="Centaur" panose="02030504050205020304" pitchFamily="18" charset="0"/>
+                </a:rPr>
+                <a:t>=     </a:t>
+              </a:r>
+              <a:r>
+                <a:rPr lang="en-US" dirty="0">
+                  <a:solidFill>
+                    <a:srgbClr val="FF0000"/>
+                  </a:solidFill>
+                  <a:latin typeface="Centaur" panose="02030504050205020304" pitchFamily="18" charset="0"/>
+                </a:rPr>
+                <a:t>0.16e8</a:t>
+              </a:r>
+              <a:r>
+                <a:rPr lang="en-US" dirty="0">
+                  <a:latin typeface="Centaur" panose="02030504050205020304" pitchFamily="18" charset="0"/>
+                </a:rPr>
+                <a:t>      +       </a:t>
+              </a:r>
+              <a:r>
+                <a:rPr lang="en-US" dirty="0">
+                  <a:solidFill>
+                    <a:srgbClr val="00B050"/>
+                  </a:solidFill>
+                  <a:latin typeface="Centaur" panose="02030504050205020304" pitchFamily="18" charset="0"/>
+                </a:rPr>
+                <a:t>0.33e8 </a:t>
+              </a:r>
+              <a:r>
+                <a:rPr lang="en-US" dirty="0">
+                  <a:latin typeface="Centaur" panose="02030504050205020304" pitchFamily="18" charset="0"/>
+                </a:rPr>
+                <a:t>          +</a:t>
+              </a:r>
+              <a:r>
+                <a:rPr lang="en-US" dirty="0">
+                  <a:solidFill>
+                    <a:srgbClr val="FFC000"/>
+                  </a:solidFill>
+                  <a:latin typeface="Centaur" panose="02030504050205020304" pitchFamily="18" charset="0"/>
+                </a:rPr>
+                <a:t>    0.012e8</a:t>
+              </a:r>
+            </a:p>
+            <a:p>
+              <a:r>
+                <a:rPr lang="en-US" dirty="0">
+                  <a:solidFill>
+                    <a:srgbClr val="0070C0"/>
+                  </a:solidFill>
+                  <a:latin typeface="Centaur" panose="02030504050205020304" pitchFamily="18" charset="0"/>
+                </a:rPr>
+                <a:t>      50.3 M </a:t>
+              </a:r>
+              <a:r>
+                <a:rPr lang="en-US" dirty="0">
+                  <a:solidFill>
+                    <a:srgbClr val="FFC000"/>
+                  </a:solidFill>
+                  <a:latin typeface="Centaur" panose="02030504050205020304" pitchFamily="18" charset="0"/>
+                </a:rPr>
+                <a:t>        </a:t>
+              </a:r>
+              <a:r>
+                <a:rPr lang="en-US" dirty="0">
+                  <a:latin typeface="Centaur" panose="02030504050205020304" pitchFamily="18" charset="0"/>
+                </a:rPr>
+                <a:t>=     </a:t>
+              </a:r>
+              <a:r>
+                <a:rPr lang="en-US" dirty="0">
+                  <a:solidFill>
+                    <a:srgbClr val="FF0000"/>
+                  </a:solidFill>
+                  <a:latin typeface="Centaur" panose="02030504050205020304" pitchFamily="18" charset="0"/>
+                </a:rPr>
+                <a:t>16 M</a:t>
+              </a:r>
+              <a:r>
+                <a:rPr lang="en-US" dirty="0">
+                  <a:latin typeface="Centaur" panose="02030504050205020304" pitchFamily="18" charset="0"/>
+                </a:rPr>
+                <a:t>        +        </a:t>
+              </a:r>
+              <a:r>
+                <a:rPr lang="en-US" dirty="0">
+                  <a:solidFill>
+                    <a:srgbClr val="00B050"/>
+                  </a:solidFill>
+                  <a:latin typeface="Centaur" panose="02030504050205020304" pitchFamily="18" charset="0"/>
+                </a:rPr>
+                <a:t>33 M </a:t>
+              </a:r>
+              <a:r>
+                <a:rPr lang="en-US" dirty="0">
+                  <a:latin typeface="Centaur" panose="02030504050205020304" pitchFamily="18" charset="0"/>
+                </a:rPr>
+                <a:t>           +</a:t>
+              </a:r>
+              <a:r>
+                <a:rPr lang="en-US" dirty="0">
+                  <a:solidFill>
+                    <a:srgbClr val="FFC000"/>
+                  </a:solidFill>
+                  <a:latin typeface="Centaur" panose="02030504050205020304" pitchFamily="18" charset="0"/>
+                </a:rPr>
+                <a:t>    1.3 M</a:t>
+              </a:r>
+            </a:p>
+          </p:txBody>
+        </p:sp>
+        <p:pic>
+          <p:nvPicPr>
+            <p:cNvPr id="29" name="Picture 28">
+              <a:extLst>
+                <a:ext uri="{FF2B5EF4-FFF2-40B4-BE49-F238E27FC236}">
+                  <a16:creationId xmlns:a16="http://schemas.microsoft.com/office/drawing/2014/main" id="{60186337-0B7E-4095-B788-25F80F4B1BB2}"/>
+                </a:ext>
+              </a:extLst>
+            </p:cNvPr>
+            <p:cNvPicPr>
+              <a:picLocks noChangeAspect="1"/>
+            </p:cNvPicPr>
+            <p:nvPr/>
+          </p:nvPicPr>
+          <p:blipFill>
+            <a:blip r:embed="rId3"/>
+            <a:stretch>
+              <a:fillRect/>
+            </a:stretch>
+          </p:blipFill>
+          <p:spPr>
+            <a:xfrm>
+              <a:off x="10477849" y="3013733"/>
+              <a:ext cx="1571538" cy="2464680"/>
+            </a:xfrm>
+            <a:prstGeom prst="ellipse">
+              <a:avLst/>
+            </a:prstGeom>
+            <a:ln w="6350" cap="rnd">
+              <a:solidFill>
+                <a:srgbClr val="7030A0"/>
+              </a:solidFill>
+              <a:prstDash val="lgDashDotDot"/>
+            </a:ln>
+            <a:effectLst>
+              <a:outerShdw blurRad="381000" dist="292100" dir="5400000" sx="-80000" sy="-18000" rotWithShape="0">
+                <a:srgbClr val="000000">
+                  <a:alpha val="22000"/>
+                </a:srgbClr>
+              </a:outerShdw>
+            </a:effectLst>
+            <a:scene3d>
+              <a:camera prst="orthographicFront"/>
+              <a:lightRig rig="contrasting" dir="t">
+                <a:rot lat="0" lon="0" rev="3000000"/>
+              </a:lightRig>
+            </a:scene3d>
+            <a:sp3d contourW="7620">
+              <a:bevelT w="95250" h="31750"/>
+              <a:contourClr>
+                <a:srgbClr val="333333"/>
+              </a:contourClr>
+            </a:sp3d>
+          </p:spPr>
+        </p:pic>
+        <p:sp>
+          <p:nvSpPr>
+            <p:cNvPr id="30" name="Oval 29">
+              <a:extLst>
+                <a:ext uri="{FF2B5EF4-FFF2-40B4-BE49-F238E27FC236}">
+                  <a16:creationId xmlns:a16="http://schemas.microsoft.com/office/drawing/2014/main" id="{CDD4D6B3-6C45-4997-A67A-439A53D82EC1}"/>
+                </a:ext>
+              </a:extLst>
+            </p:cNvPr>
+            <p:cNvSpPr/>
+            <p:nvPr/>
+          </p:nvSpPr>
+          <p:spPr>
+            <a:xfrm>
+              <a:off x="7550092" y="4202884"/>
+              <a:ext cx="603301" cy="1000743"/>
+            </a:xfrm>
+            <a:prstGeom prst="ellipse">
+              <a:avLst/>
+            </a:prstGeom>
+            <a:noFill/>
+            <a:ln>
+              <a:prstDash val="dash"/>
+            </a:ln>
+          </p:spPr>
+          <p:style>
+            <a:lnRef idx="2">
+              <a:schemeClr val="accent1">
+                <a:shade val="50000"/>
+              </a:schemeClr>
+            </a:lnRef>
+            <a:fillRef idx="1">
+              <a:schemeClr val="accent1"/>
+            </a:fillRef>
+            <a:effectRef idx="0">
+              <a:schemeClr val="accent1"/>
+            </a:effectRef>
+            <a:fontRef idx="minor">
+              <a:schemeClr val="lt1"/>
+            </a:fontRef>
+          </p:style>
+          <p:txBody>
+            <a:bodyPr rtlCol="0" anchor="ctr"/>
+            <a:lstStyle/>
+            <a:p>
+              <a:pPr algn="ctr"/>
+              <a:endParaRPr lang="en-US" dirty="0"/>
+            </a:p>
+          </p:txBody>
+        </p:sp>
+        <p:sp>
+          <p:nvSpPr>
+            <p:cNvPr id="31" name="Arrow: Notched Right 30">
+              <a:extLst>
+                <a:ext uri="{FF2B5EF4-FFF2-40B4-BE49-F238E27FC236}">
+                  <a16:creationId xmlns:a16="http://schemas.microsoft.com/office/drawing/2014/main" id="{B67CAE84-A1A0-4748-8724-60EEE59AA9CB}"/>
+                </a:ext>
+              </a:extLst>
+            </p:cNvPr>
+            <p:cNvSpPr/>
+            <p:nvPr/>
+          </p:nvSpPr>
+          <p:spPr>
+            <a:xfrm>
+              <a:off x="8676665" y="4703255"/>
+              <a:ext cx="1530302" cy="426573"/>
+            </a:xfrm>
+            <a:prstGeom prst="notchedRightArrow">
+              <a:avLst/>
+            </a:prstGeom>
+            <a:solidFill>
+              <a:schemeClr val="accent2">
+                <a:lumMod val="20000"/>
+                <a:lumOff val="80000"/>
+              </a:schemeClr>
+            </a:solidFill>
+            <a:ln>
+              <a:prstDash val="sysDash"/>
+            </a:ln>
+          </p:spPr>
+          <p:style>
+            <a:lnRef idx="2">
+              <a:schemeClr val="accent1">
+                <a:shade val="50000"/>
+              </a:schemeClr>
+            </a:lnRef>
+            <a:fillRef idx="1">
+              <a:schemeClr val="accent1"/>
+            </a:fillRef>
+            <a:effectRef idx="0">
+              <a:schemeClr val="accent1"/>
+            </a:effectRef>
+            <a:fontRef idx="minor">
+              <a:schemeClr val="lt1"/>
+            </a:fontRef>
+          </p:style>
+          <p:txBody>
+            <a:bodyPr rtlCol="0" anchor="ctr"/>
+            <a:lstStyle/>
+            <a:p>
+              <a:pPr algn="ctr"/>
+              <a:endParaRPr lang="en-US" dirty="0">
+                <a:noFill/>
+              </a:endParaRPr>
+            </a:p>
+          </p:txBody>
+        </p:sp>
+      </p:grpSp>
+      <p:sp>
+        <p:nvSpPr>
+          <p:cNvPr id="16" name="TextBox 15">
+            <a:extLst>
+              <a:ext uri="{FF2B5EF4-FFF2-40B4-BE49-F238E27FC236}">
+                <a16:creationId xmlns:a16="http://schemas.microsoft.com/office/drawing/2014/main" id="{0FA7E876-9D38-4441-A1D1-04D6F2EE377E}"/>
+              </a:ext>
+            </a:extLst>
+          </p:cNvPr>
+          <p:cNvSpPr txBox="1"/>
+          <p:nvPr/>
+        </p:nvSpPr>
         <p:spPr>
           <a:xfrm>
-            <a:off x="452807" y="827074"/>
-            <a:ext cx="11286386" cy="5643192"/>
-          </a:xfrm>
-          <a:prstGeom prst="rect">
-            <a:avLst/>
-          </a:prstGeom>
-        </p:spPr>
-      </p:pic>
-      <p:cxnSp>
-        <p:nvCxnSpPr>
-          <p:cNvPr id="12" name="Straight Connector 11">
-            <a:extLst>
-              <a:ext uri="{FF2B5EF4-FFF2-40B4-BE49-F238E27FC236}">
-                <a16:creationId xmlns:a16="http://schemas.microsoft.com/office/drawing/2014/main" id="{28183E56-8C91-4D07-B069-DCF6777EC2A8}"/>
-              </a:ext>
-            </a:extLst>
-          </p:cNvPr>
-          <p:cNvCxnSpPr>
-            <a:cxnSpLocks/>
-          </p:cNvCxnSpPr>
-          <p:nvPr/>
-        </p:nvCxnSpPr>
-        <p:spPr>
-          <a:xfrm>
-            <a:off x="7117359" y="4373026"/>
-            <a:ext cx="0" cy="1377086"/>
-          </a:xfrm>
-          <a:prstGeom prst="line">
-            <a:avLst/>
-          </a:prstGeom>
-          <a:ln>
-            <a:prstDash val="lgDashDotDot"/>
-          </a:ln>
-        </p:spPr>
-        <p:style>
-          <a:lnRef idx="1">
-            <a:schemeClr val="accent1"/>
-          </a:lnRef>
-          <a:fillRef idx="0">
-            <a:schemeClr val="accent1"/>
-          </a:fillRef>
-          <a:effectRef idx="0">
-            <a:schemeClr val="accent1"/>
-          </a:effectRef>
-          <a:fontRef idx="minor">
-            <a:schemeClr val="tx1"/>
-          </a:fontRef>
-        </p:style>
-      </p:cxnSp>
-      <p:cxnSp>
-        <p:nvCxnSpPr>
-          <p:cNvPr id="14" name="Straight Connector 13">
-            <a:extLst>
-              <a:ext uri="{FF2B5EF4-FFF2-40B4-BE49-F238E27FC236}">
-                <a16:creationId xmlns:a16="http://schemas.microsoft.com/office/drawing/2014/main" id="{1ADFAFD7-F17B-45D1-AE2D-43C20CEAA64B}"/>
-              </a:ext>
-            </a:extLst>
-          </p:cNvPr>
-          <p:cNvCxnSpPr>
-            <a:cxnSpLocks/>
-          </p:cNvCxnSpPr>
-          <p:nvPr/>
-        </p:nvCxnSpPr>
-        <p:spPr>
-          <a:xfrm>
-            <a:off x="1835788" y="4363537"/>
-            <a:ext cx="5289960" cy="1"/>
-          </a:xfrm>
-          <a:prstGeom prst="line">
-            <a:avLst/>
-          </a:prstGeom>
-          <a:ln>
-            <a:prstDash val="lgDashDotDot"/>
-          </a:ln>
-        </p:spPr>
-        <p:style>
-          <a:lnRef idx="1">
-            <a:schemeClr val="accent1"/>
-          </a:lnRef>
-          <a:fillRef idx="0">
-            <a:schemeClr val="accent1"/>
-          </a:fillRef>
-          <a:effectRef idx="0">
-            <a:schemeClr val="accent1"/>
-          </a:effectRef>
-          <a:fontRef idx="minor">
-            <a:schemeClr val="tx1"/>
-          </a:fontRef>
-        </p:style>
-      </p:cxnSp>
-      <p:cxnSp>
-        <p:nvCxnSpPr>
-          <p:cNvPr id="22" name="Straight Connector 21">
-            <a:extLst>
-              <a:ext uri="{FF2B5EF4-FFF2-40B4-BE49-F238E27FC236}">
-                <a16:creationId xmlns:a16="http://schemas.microsoft.com/office/drawing/2014/main" id="{07E921A9-0C08-419A-9E43-3526E046626B}"/>
-              </a:ext>
-            </a:extLst>
-          </p:cNvPr>
-          <p:cNvCxnSpPr>
-            <a:cxnSpLocks/>
-          </p:cNvCxnSpPr>
-          <p:nvPr/>
-        </p:nvCxnSpPr>
-        <p:spPr>
-          <a:xfrm flipV="1">
-            <a:off x="1835788" y="5203632"/>
-            <a:ext cx="5289960" cy="1"/>
-          </a:xfrm>
-          <a:prstGeom prst="line">
-            <a:avLst/>
-          </a:prstGeom>
-          <a:ln>
-            <a:prstDash val="lgDashDotDot"/>
-          </a:ln>
-        </p:spPr>
-        <p:style>
-          <a:lnRef idx="1">
-            <a:schemeClr val="accent1"/>
-          </a:lnRef>
-          <a:fillRef idx="0">
-            <a:schemeClr val="accent1"/>
-          </a:fillRef>
-          <a:effectRef idx="0">
-            <a:schemeClr val="accent1"/>
-          </a:effectRef>
-          <a:fontRef idx="minor">
-            <a:schemeClr val="tx1"/>
-          </a:fontRef>
-        </p:style>
-      </p:cxnSp>
-      <p:cxnSp>
-        <p:nvCxnSpPr>
-          <p:cNvPr id="26" name="Straight Connector 25">
-            <a:extLst>
-              <a:ext uri="{FF2B5EF4-FFF2-40B4-BE49-F238E27FC236}">
-                <a16:creationId xmlns:a16="http://schemas.microsoft.com/office/drawing/2014/main" id="{3BFEDEAE-32FF-4FC8-A130-30D125E4294A}"/>
-              </a:ext>
-            </a:extLst>
-          </p:cNvPr>
-          <p:cNvCxnSpPr>
-            <a:cxnSpLocks/>
-          </p:cNvCxnSpPr>
-          <p:nvPr/>
-        </p:nvCxnSpPr>
-        <p:spPr>
-          <a:xfrm flipV="1">
-            <a:off x="1810622" y="4777054"/>
-            <a:ext cx="5289960" cy="1"/>
-          </a:xfrm>
-          <a:prstGeom prst="line">
-            <a:avLst/>
-          </a:prstGeom>
-          <a:ln>
-            <a:prstDash val="lgDashDotDot"/>
-          </a:ln>
-        </p:spPr>
-        <p:style>
-          <a:lnRef idx="1">
-            <a:schemeClr val="accent1"/>
-          </a:lnRef>
-          <a:fillRef idx="0">
-            <a:schemeClr val="accent1"/>
-          </a:fillRef>
-          <a:effectRef idx="0">
-            <a:schemeClr val="accent1"/>
-          </a:effectRef>
-          <a:fontRef idx="minor">
-            <a:schemeClr val="tx1"/>
-          </a:fontRef>
-        </p:style>
-      </p:cxnSp>
-      <p:sp>
-        <p:nvSpPr>
-          <p:cNvPr id="27" name="TextBox 26">
-            <a:extLst>
-              <a:ext uri="{FF2B5EF4-FFF2-40B4-BE49-F238E27FC236}">
-                <a16:creationId xmlns:a16="http://schemas.microsoft.com/office/drawing/2014/main" id="{68130FF9-79BF-472B-90AA-1B351D2CDAEC}"/>
-              </a:ext>
-            </a:extLst>
-          </p:cNvPr>
-          <p:cNvSpPr txBox="1"/>
-          <p:nvPr/>
-        </p:nvSpPr>
-        <p:spPr>
-          <a:xfrm>
-            <a:off x="2004968" y="2792631"/>
-            <a:ext cx="5922625" cy="923330"/>
+            <a:off x="967098" y="5921864"/>
+            <a:ext cx="10601320" cy="461665"/>
           </a:xfrm>
           <a:prstGeom prst="rect">
             <a:avLst/>
@@ -12075,387 +13258,16 @@
           <a:lstStyle/>
           <a:p>
             <a:r>
-              <a:rPr lang="en-US" dirty="0">
+              <a:rPr lang="en-US" sz="1200" b="0" i="0" dirty="0">
                 <a:solidFill>
-                  <a:srgbClr val="0070C0"/>
+                  <a:srgbClr val="000000"/>
                 </a:solidFill>
-                <a:latin typeface="Centaur" panose="02030504050205020304" pitchFamily="18" charset="0"/>
+                <a:effectLst/>
+                <a:latin typeface="Helvetica Neue"/>
               </a:rPr>
-              <a:t>Confirmed Cases </a:t>
-            </a:r>
-            <a:r>
-              <a:rPr lang="en-US" dirty="0">
-                <a:latin typeface="Centaur" panose="02030504050205020304" pitchFamily="18" charset="0"/>
-              </a:rPr>
-              <a:t>=</a:t>
-            </a:r>
-            <a:r>
-              <a:rPr lang="en-US" dirty="0">
-                <a:solidFill>
-                  <a:srgbClr val="0070C0"/>
-                </a:solidFill>
-                <a:latin typeface="Centaur" panose="02030504050205020304" pitchFamily="18" charset="0"/>
-              </a:rPr>
-              <a:t>  </a:t>
-            </a:r>
-            <a:r>
-              <a:rPr lang="en-US" dirty="0">
-                <a:solidFill>
-                  <a:srgbClr val="FF0000"/>
-                </a:solidFill>
-                <a:latin typeface="Centaur" panose="02030504050205020304" pitchFamily="18" charset="0"/>
-              </a:rPr>
-              <a:t>Active Cases </a:t>
-            </a:r>
-            <a:r>
-              <a:rPr lang="en-US" dirty="0">
-                <a:latin typeface="Centaur" panose="02030504050205020304" pitchFamily="18" charset="0"/>
-              </a:rPr>
-              <a:t>+</a:t>
-            </a:r>
-            <a:r>
-              <a:rPr lang="en-US" dirty="0">
-                <a:solidFill>
-                  <a:srgbClr val="0070C0"/>
-                </a:solidFill>
-                <a:latin typeface="Centaur" panose="02030504050205020304" pitchFamily="18" charset="0"/>
-              </a:rPr>
-              <a:t>  </a:t>
-            </a:r>
-            <a:r>
-              <a:rPr lang="en-US" dirty="0">
-                <a:solidFill>
-                  <a:srgbClr val="00B050"/>
-                </a:solidFill>
-                <a:latin typeface="Centaur" panose="02030504050205020304" pitchFamily="18" charset="0"/>
-              </a:rPr>
-              <a:t>Recovered Cases  </a:t>
-            </a:r>
-            <a:r>
-              <a:rPr lang="en-US" dirty="0">
-                <a:latin typeface="Centaur" panose="02030504050205020304" pitchFamily="18" charset="0"/>
-              </a:rPr>
-              <a:t>+</a:t>
-            </a:r>
-            <a:r>
-              <a:rPr lang="en-US" dirty="0">
-                <a:solidFill>
-                  <a:srgbClr val="0070C0"/>
-                </a:solidFill>
-                <a:latin typeface="Centaur" panose="02030504050205020304" pitchFamily="18" charset="0"/>
-              </a:rPr>
-              <a:t>     </a:t>
-            </a:r>
-            <a:r>
-              <a:rPr lang="en-US" dirty="0">
-                <a:solidFill>
-                  <a:srgbClr val="FFC000"/>
-                </a:solidFill>
-                <a:latin typeface="Centaur" panose="02030504050205020304" pitchFamily="18" charset="0"/>
-              </a:rPr>
-              <a:t>Deaths</a:t>
-            </a:r>
-          </a:p>
-          <a:p>
-            <a:r>
-              <a:rPr lang="en-US" dirty="0">
-                <a:solidFill>
-                  <a:srgbClr val="FFC000"/>
-                </a:solidFill>
-                <a:latin typeface="Centaur" panose="02030504050205020304" pitchFamily="18" charset="0"/>
-              </a:rPr>
-              <a:t>     </a:t>
-            </a:r>
-            <a:r>
-              <a:rPr lang="en-US" dirty="0">
-                <a:solidFill>
-                  <a:srgbClr val="0070C0"/>
-                </a:solidFill>
-                <a:latin typeface="Centaur" panose="02030504050205020304" pitchFamily="18" charset="0"/>
-              </a:rPr>
-              <a:t>0.502e8 </a:t>
-            </a:r>
-            <a:r>
-              <a:rPr lang="en-US" dirty="0">
-                <a:solidFill>
-                  <a:srgbClr val="FFC000"/>
-                </a:solidFill>
-                <a:latin typeface="Centaur" panose="02030504050205020304" pitchFamily="18" charset="0"/>
-              </a:rPr>
-              <a:t>        </a:t>
-            </a:r>
-            <a:r>
-              <a:rPr lang="en-US" dirty="0">
-                <a:latin typeface="Centaur" panose="02030504050205020304" pitchFamily="18" charset="0"/>
-              </a:rPr>
-              <a:t>=     </a:t>
-            </a:r>
-            <a:r>
-              <a:rPr lang="en-US" dirty="0">
-                <a:solidFill>
-                  <a:srgbClr val="FF0000"/>
-                </a:solidFill>
-                <a:latin typeface="Centaur" panose="02030504050205020304" pitchFamily="18" charset="0"/>
-              </a:rPr>
-              <a:t>0.16e8</a:t>
-            </a:r>
-            <a:r>
-              <a:rPr lang="en-US" dirty="0">
-                <a:latin typeface="Centaur" panose="02030504050205020304" pitchFamily="18" charset="0"/>
-              </a:rPr>
-              <a:t>      +       </a:t>
-            </a:r>
-            <a:r>
-              <a:rPr lang="en-US" dirty="0">
-                <a:solidFill>
-                  <a:srgbClr val="00B050"/>
-                </a:solidFill>
-                <a:latin typeface="Centaur" panose="02030504050205020304" pitchFamily="18" charset="0"/>
-              </a:rPr>
-              <a:t>0.33e8 </a:t>
-            </a:r>
-            <a:r>
-              <a:rPr lang="en-US" dirty="0">
-                <a:latin typeface="Centaur" panose="02030504050205020304" pitchFamily="18" charset="0"/>
-              </a:rPr>
-              <a:t>          +</a:t>
-            </a:r>
-            <a:r>
-              <a:rPr lang="en-US" dirty="0">
-                <a:solidFill>
-                  <a:srgbClr val="FFC000"/>
-                </a:solidFill>
-                <a:latin typeface="Centaur" panose="02030504050205020304" pitchFamily="18" charset="0"/>
-              </a:rPr>
-              <a:t>    0.012e8</a:t>
-            </a:r>
-          </a:p>
-          <a:p>
-            <a:r>
-              <a:rPr lang="en-US" dirty="0">
-                <a:solidFill>
-                  <a:srgbClr val="0070C0"/>
-                </a:solidFill>
-                <a:latin typeface="Centaur" panose="02030504050205020304" pitchFamily="18" charset="0"/>
-              </a:rPr>
-              <a:t>      50.3 M </a:t>
-            </a:r>
-            <a:r>
-              <a:rPr lang="en-US" dirty="0">
-                <a:solidFill>
-                  <a:srgbClr val="FFC000"/>
-                </a:solidFill>
-                <a:latin typeface="Centaur" panose="02030504050205020304" pitchFamily="18" charset="0"/>
-              </a:rPr>
-              <a:t>        </a:t>
-            </a:r>
-            <a:r>
-              <a:rPr lang="en-US" dirty="0">
-                <a:latin typeface="Centaur" panose="02030504050205020304" pitchFamily="18" charset="0"/>
-              </a:rPr>
-              <a:t>=     </a:t>
-            </a:r>
-            <a:r>
-              <a:rPr lang="en-US" dirty="0">
-                <a:solidFill>
-                  <a:srgbClr val="FF0000"/>
-                </a:solidFill>
-                <a:latin typeface="Centaur" panose="02030504050205020304" pitchFamily="18" charset="0"/>
-              </a:rPr>
-              <a:t>16 M</a:t>
-            </a:r>
-            <a:r>
-              <a:rPr lang="en-US" dirty="0">
-                <a:latin typeface="Centaur" panose="02030504050205020304" pitchFamily="18" charset="0"/>
-              </a:rPr>
-              <a:t>        +        </a:t>
-            </a:r>
-            <a:r>
-              <a:rPr lang="en-US" dirty="0">
-                <a:solidFill>
-                  <a:srgbClr val="00B050"/>
-                </a:solidFill>
-                <a:latin typeface="Centaur" panose="02030504050205020304" pitchFamily="18" charset="0"/>
-              </a:rPr>
-              <a:t>33 M </a:t>
-            </a:r>
-            <a:r>
-              <a:rPr lang="en-US" dirty="0">
-                <a:latin typeface="Centaur" panose="02030504050205020304" pitchFamily="18" charset="0"/>
-              </a:rPr>
-              <a:t>           +</a:t>
-            </a:r>
-            <a:r>
-              <a:rPr lang="en-US" dirty="0">
-                <a:solidFill>
-                  <a:srgbClr val="FFC000"/>
-                </a:solidFill>
-                <a:latin typeface="Centaur" panose="02030504050205020304" pitchFamily="18" charset="0"/>
-              </a:rPr>
-              <a:t>    1.3 M</a:t>
-            </a:r>
-          </a:p>
-        </p:txBody>
-      </p:sp>
-      <p:pic>
-        <p:nvPicPr>
-          <p:cNvPr id="29" name="Picture 28">
-            <a:extLst>
-              <a:ext uri="{FF2B5EF4-FFF2-40B4-BE49-F238E27FC236}">
-                <a16:creationId xmlns:a16="http://schemas.microsoft.com/office/drawing/2014/main" id="{60186337-0B7E-4095-B788-25F80F4B1BB2}"/>
-              </a:ext>
-            </a:extLst>
-          </p:cNvPr>
-          <p:cNvPicPr>
-            <a:picLocks noChangeAspect="1"/>
-          </p:cNvPicPr>
-          <p:nvPr/>
-        </p:nvPicPr>
-        <p:blipFill>
-          <a:blip r:embed="rId3"/>
-          <a:stretch>
-            <a:fillRect/>
-          </a:stretch>
-        </p:blipFill>
-        <p:spPr>
-          <a:xfrm>
-            <a:off x="10477849" y="3013733"/>
-            <a:ext cx="1571538" cy="2464680"/>
-          </a:xfrm>
-          <a:prstGeom prst="ellipse">
-            <a:avLst/>
-          </a:prstGeom>
-          <a:ln w="6350" cap="rnd">
-            <a:solidFill>
-              <a:srgbClr val="7030A0"/>
-            </a:solidFill>
-            <a:prstDash val="lgDashDotDot"/>
-          </a:ln>
-          <a:effectLst>
-            <a:outerShdw blurRad="381000" dist="292100" dir="5400000" sx="-80000" sy="-18000" rotWithShape="0">
-              <a:srgbClr val="000000">
-                <a:alpha val="22000"/>
-              </a:srgbClr>
-            </a:outerShdw>
-          </a:effectLst>
-          <a:scene3d>
-            <a:camera prst="orthographicFront"/>
-            <a:lightRig rig="contrasting" dir="t">
-              <a:rot lat="0" lon="0" rev="3000000"/>
-            </a:lightRig>
-          </a:scene3d>
-          <a:sp3d contourW="7620">
-            <a:bevelT w="95250" h="31750"/>
-            <a:contourClr>
-              <a:srgbClr val="333333"/>
-            </a:contourClr>
-          </a:sp3d>
-        </p:spPr>
-      </p:pic>
-      <p:sp>
-        <p:nvSpPr>
-          <p:cNvPr id="30" name="Oval 29">
-            <a:extLst>
-              <a:ext uri="{FF2B5EF4-FFF2-40B4-BE49-F238E27FC236}">
-                <a16:creationId xmlns:a16="http://schemas.microsoft.com/office/drawing/2014/main" id="{CDD4D6B3-6C45-4997-A67A-439A53D82EC1}"/>
-              </a:ext>
-            </a:extLst>
-          </p:cNvPr>
-          <p:cNvSpPr/>
-          <p:nvPr/>
-        </p:nvSpPr>
-        <p:spPr>
-          <a:xfrm>
-            <a:off x="7550092" y="4202884"/>
-            <a:ext cx="603301" cy="1000743"/>
-          </a:xfrm>
-          <a:prstGeom prst="ellipse">
-            <a:avLst/>
-          </a:prstGeom>
-          <a:noFill/>
-          <a:ln>
-            <a:prstDash val="dash"/>
-          </a:ln>
-        </p:spPr>
-        <p:style>
-          <a:lnRef idx="2">
-            <a:schemeClr val="accent1">
-              <a:shade val="50000"/>
-            </a:schemeClr>
-          </a:lnRef>
-          <a:fillRef idx="1">
-            <a:schemeClr val="accent1"/>
-          </a:fillRef>
-          <a:effectRef idx="0">
-            <a:schemeClr val="accent1"/>
-          </a:effectRef>
-          <a:fontRef idx="minor">
-            <a:schemeClr val="lt1"/>
-          </a:fontRef>
-        </p:style>
-        <p:txBody>
-          <a:bodyPr rtlCol="0" anchor="ctr"/>
-          <a:lstStyle/>
-          <a:p>
-            <a:pPr algn="ctr"/>
-            <a:endParaRPr lang="en-US" dirty="0"/>
-          </a:p>
-        </p:txBody>
-      </p:sp>
-      <p:sp>
-        <p:nvSpPr>
-          <p:cNvPr id="31" name="Arrow: Notched Right 30">
-            <a:extLst>
-              <a:ext uri="{FF2B5EF4-FFF2-40B4-BE49-F238E27FC236}">
-                <a16:creationId xmlns:a16="http://schemas.microsoft.com/office/drawing/2014/main" id="{B67CAE84-A1A0-4748-8724-60EEE59AA9CB}"/>
-              </a:ext>
-            </a:extLst>
-          </p:cNvPr>
-          <p:cNvSpPr/>
-          <p:nvPr/>
-        </p:nvSpPr>
-        <p:spPr>
-          <a:xfrm>
-            <a:off x="8676665" y="4703255"/>
-            <a:ext cx="1530302" cy="426573"/>
-          </a:xfrm>
-          <a:prstGeom prst="notchedRightArrow">
-            <a:avLst/>
-          </a:prstGeom>
-          <a:solidFill>
-            <a:schemeClr val="accent2">
-              <a:lumMod val="20000"/>
-              <a:lumOff val="80000"/>
-            </a:schemeClr>
-          </a:solidFill>
-          <a:ln>
-            <a:prstDash val="sysDash"/>
-          </a:ln>
-        </p:spPr>
-        <p:style>
-          <a:lnRef idx="2">
-            <a:schemeClr val="accent1">
-              <a:shade val="50000"/>
-            </a:schemeClr>
-          </a:lnRef>
-          <a:fillRef idx="1">
-            <a:schemeClr val="accent1"/>
-          </a:fillRef>
-          <a:effectRef idx="0">
-            <a:schemeClr val="accent1"/>
-          </a:effectRef>
-          <a:fontRef idx="minor">
-            <a:schemeClr val="lt1"/>
-          </a:fontRef>
-        </p:style>
-        <p:txBody>
-          <a:bodyPr rtlCol="0" anchor="ctr"/>
-          <a:lstStyle/>
-          <a:p>
-            <a:pPr algn="ctr"/>
-            <a:endParaRPr lang="en-US" dirty="0">
-              <a:noFill/>
-            </a:endParaRPr>
+              <a:t>Note: Effective 12/14/2020, the US discontinued reporting the number of recoveries on a daily bases. This represents a 6.3M adjustment to cumulative recoveries. The US has continued to report "zero" recoveries since.</a:t>
+            </a:r>
+            <a:endParaRPr lang="en-US" sz="1200" dirty="0"/>
           </a:p>
         </p:txBody>
       </p:sp>
@@ -12802,7 +13614,7 @@
                 <a:latin typeface="Arial" panose="020B0604020202020204" pitchFamily="34" charset="0"/>
                 <a:cs typeface="Arial" panose="020B0604020202020204" pitchFamily="34" charset="0"/>
               </a:rPr>
-              <a:t>1.3e6 = 0.012e8</a:t>
+              <a:t>1.3 e6 = 0.012 e8</a:t>
             </a:r>
           </a:p>
         </p:txBody>
@@ -12821,7 +13633,7 @@
 </file>
 
 <file path=ppt/slides/slide7.xml><?xml version="1.0" encoding="utf-8"?>
-<p:sld xmlns:a="http://schemas.openxmlformats.org/drawingml/2006/main" xmlns:r="http://schemas.openxmlformats.org/officeDocument/2006/relationships" xmlns:p="http://schemas.openxmlformats.org/presentationml/2006/main">
+<p:sld xmlns:a="http://schemas.openxmlformats.org/drawingml/2006/main" xmlns:r="http://schemas.openxmlformats.org/officeDocument/2006/relationships" xmlns:p="http://schemas.openxmlformats.org/presentationml/2006/main" show="0">
   <p:cSld>
     <p:spTree>
       <p:nvGrpSpPr>

</xml_diff>